<commit_message>
Update 16/3 -- 1
</commit_message>
<xml_diff>
--- a/Synopsis/Synopsis Presentation.pptx
+++ b/Synopsis/Synopsis Presentation.pptx
@@ -3522,7 +3522,7 @@
         </p:nvSpPr>
         <p:spPr>
           <a:xfrm>
-            <a:off x="1332017" y="4814955"/>
+            <a:off x="974663" y="4878035"/>
             <a:ext cx="3601713" cy="707886"/>
           </a:xfrm>
           <a:prstGeom prst="rect">
@@ -3576,7 +3576,7 @@
         </p:nvSpPr>
         <p:spPr>
           <a:xfrm>
-            <a:off x="5591264" y="4815672"/>
+            <a:off x="4913043" y="4877296"/>
             <a:ext cx="1903732" cy="707886"/>
           </a:xfrm>
           <a:prstGeom prst="rect">
@@ -3623,7 +3623,7 @@
         </p:nvSpPr>
         <p:spPr>
           <a:xfrm>
-            <a:off x="8152531" y="4814955"/>
+            <a:off x="7220973" y="4877296"/>
             <a:ext cx="1903732" cy="707886"/>
           </a:xfrm>
           <a:prstGeom prst="rect">
@@ -3670,7 +3670,7 @@
         </p:nvSpPr>
         <p:spPr>
           <a:xfrm>
-            <a:off x="1020022" y="3004931"/>
+            <a:off x="1020021" y="2809174"/>
             <a:ext cx="10142202" cy="1500411"/>
           </a:xfrm>
           <a:prstGeom prst="rect">
@@ -3783,7 +3783,7 @@
               </a:spcBef>
             </a:pPr>
             <a:r>
-              <a:rPr lang="en-IN" sz="4400" b="1" dirty="0" err="1">
+              <a:rPr lang="en-US" sz="4400" b="1" dirty="0">
                 <a:solidFill>
                   <a:schemeClr val="accent1">
                     <a:lumMod val="75000"/>
@@ -3792,10 +3792,10 @@
                 <a:latin typeface="Times New Roman" panose="02020603050405020304" pitchFamily="18" charset="0"/>
                 <a:cs typeface="Times New Roman" panose="02020603050405020304" pitchFamily="18" charset="0"/>
               </a:rPr>
-              <a:t>Patrsrijan</a:t>
-            </a:r>
-            <a:r>
-              <a:rPr lang="en-IN" sz="4400" b="1" dirty="0">
+              <a:t>W</a:t>
+            </a:r>
+            <a:r>
+              <a:rPr lang="en-IN" sz="4400" b="1" dirty="0" err="1">
                 <a:solidFill>
                   <a:schemeClr val="accent1">
                     <a:lumMod val="75000"/>
@@ -3804,7 +3804,19 @@
                 <a:latin typeface="Times New Roman" panose="02020603050405020304" pitchFamily="18" charset="0"/>
                 <a:cs typeface="Times New Roman" panose="02020603050405020304" pitchFamily="18" charset="0"/>
               </a:rPr>
-              <a:t> - Streamlining Certificate Creation</a:t>
+              <a:t>eb</a:t>
+            </a:r>
+            <a:r>
+              <a:rPr lang="en-IN" sz="4400" b="1" dirty="0">
+                <a:solidFill>
+                  <a:schemeClr val="accent1">
+                    <a:lumMod val="75000"/>
+                  </a:schemeClr>
+                </a:solidFill>
+                <a:latin typeface="Times New Roman" panose="02020603050405020304" pitchFamily="18" charset="0"/>
+                <a:cs typeface="Times New Roman" panose="02020603050405020304" pitchFamily="18" charset="0"/>
+              </a:rPr>
+              <a:t>-Based Automatic Timetable Scheduler for Schools &amp; Colleges</a:t>
             </a:r>
             <a:endParaRPr lang="en-US" sz="4400" b="1" dirty="0">
               <a:solidFill>
@@ -3830,7 +3842,7 @@
         </p:nvSpPr>
         <p:spPr>
           <a:xfrm>
-            <a:off x="2085033" y="2402320"/>
+            <a:off x="2142539" y="2282961"/>
             <a:ext cx="7897167" cy="507831"/>
           </a:xfrm>
           <a:prstGeom prst="rect">
@@ -3946,34 +3958,14 @@
               </a:spcBef>
             </a:pPr>
             <a:r>
-              <a:rPr sz="3200" b="1" spc="-40" dirty="0">
+              <a:rPr lang="en-US" sz="3200" b="1" spc="-15" dirty="0">
                 <a:solidFill>
                   <a:srgbClr val="2B2B2B"/>
                 </a:solidFill>
                 <a:latin typeface="Times New Roman" panose="02020603050405020304" pitchFamily="18" charset="0"/>
                 <a:cs typeface="Times New Roman" panose="02020603050405020304" pitchFamily="18" charset="0"/>
               </a:rPr>
-              <a:t>A</a:t>
-            </a:r>
-            <a:r>
-              <a:rPr lang="en-IN" sz="3200" b="1" spc="-85" dirty="0">
-                <a:solidFill>
-                  <a:srgbClr val="2B2B2B"/>
-                </a:solidFill>
-                <a:latin typeface="Times New Roman" panose="02020603050405020304" pitchFamily="18" charset="0"/>
-                <a:cs typeface="Times New Roman" panose="02020603050405020304" pitchFamily="18" charset="0"/>
-              </a:rPr>
-              <a:t> Mini </a:t>
-            </a:r>
-            <a:r>
-              <a:rPr lang="en-US" sz="3200" b="1" spc="-15" dirty="0">
-                <a:solidFill>
-                  <a:srgbClr val="2B2B2B"/>
-                </a:solidFill>
-                <a:latin typeface="Times New Roman" panose="02020603050405020304" pitchFamily="18" charset="0"/>
-                <a:cs typeface="Times New Roman" panose="02020603050405020304" pitchFamily="18" charset="0"/>
-              </a:rPr>
-              <a:t>Project Synopsis</a:t>
+              <a:t>Project Phase I Synopsis</a:t>
             </a:r>
             <a:r>
               <a:rPr sz="3200" b="1" spc="-85" dirty="0">
@@ -4036,8 +4028,8 @@
         </p:nvSpPr>
         <p:spPr>
           <a:xfrm>
-            <a:off x="1332017" y="5951119"/>
-            <a:ext cx="3549561" cy="400110"/>
+            <a:off x="977121" y="5853040"/>
+            <a:ext cx="3599255" cy="400110"/>
           </a:xfrm>
           <a:prstGeom prst="rect">
             <a:avLst/>
@@ -4062,21 +4054,7 @@
                 <a:latin typeface="Times New Roman" panose="02020603050405020304" pitchFamily="18" charset="0"/>
                 <a:cs typeface="Times New Roman" panose="02020603050405020304" pitchFamily="18" charset="0"/>
               </a:rPr>
-              <a:t>Prof. </a:t>
-            </a:r>
-            <a:r>
-              <a:rPr lang="en-US" sz="2000" b="1" dirty="0" err="1">
-                <a:latin typeface="Times New Roman" panose="02020603050405020304" pitchFamily="18" charset="0"/>
-                <a:cs typeface="Times New Roman" panose="02020603050405020304" pitchFamily="18" charset="0"/>
-              </a:rPr>
-              <a:t>Nagaraja</a:t>
-            </a:r>
-            <a:r>
-              <a:rPr lang="en-US" sz="2000" b="1" dirty="0">
-                <a:latin typeface="Times New Roman" panose="02020603050405020304" pitchFamily="18" charset="0"/>
-                <a:cs typeface="Times New Roman" panose="02020603050405020304" pitchFamily="18" charset="0"/>
-              </a:rPr>
-              <a:t> N S</a:t>
+              <a:t>Prof. Chaithanya D</a:t>
             </a:r>
             <a:endParaRPr lang="en-IN" sz="2000" b="1" dirty="0">
               <a:latin typeface="Times New Roman" panose="02020603050405020304" pitchFamily="18" charset="0"/>
@@ -4142,7 +4120,7 @@
         </p:blipFill>
         <p:spPr>
           <a:xfrm>
-            <a:off x="9755666" y="431699"/>
+            <a:off x="10085593" y="196188"/>
             <a:ext cx="1076630" cy="1076630"/>
           </a:xfrm>
           <a:prstGeom prst="rect">
@@ -4178,7 +4156,7 @@
         </p:blipFill>
         <p:spPr>
           <a:xfrm>
-            <a:off x="1332017" y="389357"/>
+            <a:off x="1020021" y="246767"/>
             <a:ext cx="1537116" cy="1076630"/>
           </a:xfrm>
           <a:prstGeom prst="rect">
@@ -4202,8 +4180,8 @@
         </p:nvSpPr>
         <p:spPr>
           <a:xfrm>
-            <a:off x="2887427" y="208950"/>
-            <a:ext cx="6407392" cy="380873"/>
+            <a:off x="351331" y="195029"/>
+            <a:ext cx="11534602" cy="380873"/>
           </a:xfrm>
           <a:prstGeom prst="rect">
             <a:avLst/>
@@ -4372,8 +4350,8 @@
         </p:nvSpPr>
         <p:spPr>
           <a:xfrm>
-            <a:off x="3195499" y="435622"/>
-            <a:ext cx="6081026" cy="1125116"/>
+            <a:off x="351330" y="435622"/>
+            <a:ext cx="11489340" cy="1125116"/>
           </a:xfrm>
           <a:prstGeom prst="rect">
             <a:avLst/>
@@ -4869,8 +4847,8 @@
         </p:nvSpPr>
         <p:spPr>
           <a:xfrm>
-            <a:off x="2031142" y="1759185"/>
-            <a:ext cx="8262839" cy="646331"/>
+            <a:off x="351330" y="1655518"/>
+            <a:ext cx="11489340" cy="369332"/>
           </a:xfrm>
           <a:prstGeom prst="rect">
             <a:avLst/>
@@ -4878,11 +4856,12 @@
           <a:noFill/>
         </p:spPr>
         <p:txBody>
-          <a:bodyPr wrap="none" rtlCol="0">
+          <a:bodyPr wrap="square" rtlCol="0">
             <a:spAutoFit/>
           </a:bodyPr>
           <a:lstStyle/>
           <a:p>
+            <a:pPr algn="ctr"/>
             <a:r>
               <a:rPr lang="en-US" sz="1800" b="1" spc="-120" dirty="0">
                 <a:solidFill>
@@ -4921,12 +4900,52 @@
               <a:cs typeface="Times New Roman" panose="02020603050405020304" pitchFamily="18" charset="0"/>
             </a:endParaRPr>
           </a:p>
-          <a:p>
-            <a:endParaRPr lang="en-IN" dirty="0">
-              <a:solidFill>
-                <a:srgbClr val="FF5757"/>
-              </a:solidFill>
-            </a:endParaRPr>
+        </p:txBody>
+      </p:sp>
+      <p:sp>
+        <p:nvSpPr>
+          <p:cNvPr id="2" name="TextBox 1">
+            <a:extLst>
+              <a:ext uri="{FF2B5EF4-FFF2-40B4-BE49-F238E27FC236}">
+                <a16:creationId xmlns:a16="http://schemas.microsoft.com/office/drawing/2014/main" id="{7C98FF11-04AB-5EB9-CFFA-0B20AFA29D15}"/>
+              </a:ext>
+            </a:extLst>
+          </p:cNvPr>
+          <p:cNvSpPr txBox="1"/>
+          <p:nvPr/>
+        </p:nvSpPr>
+        <p:spPr>
+          <a:xfrm>
+            <a:off x="9528903" y="4877296"/>
+            <a:ext cx="1903732" cy="707886"/>
+          </a:xfrm>
+          <a:prstGeom prst="rect">
+            <a:avLst/>
+          </a:prstGeom>
+          <a:noFill/>
+        </p:spPr>
+        <p:txBody>
+          <a:bodyPr wrap="square" rtlCol="0">
+            <a:spAutoFit/>
+          </a:bodyPr>
+          <a:lstStyle/>
+          <a:p>
+            <a:r>
+              <a:rPr lang="en-IN" sz="2000" b="1" dirty="0">
+                <a:latin typeface="Times New Roman" panose="02020603050405020304" pitchFamily="18" charset="0"/>
+                <a:cs typeface="Times New Roman" panose="02020603050405020304" pitchFamily="18" charset="0"/>
+              </a:rPr>
+              <a:t>Supreetha N S</a:t>
+            </a:r>
+          </a:p>
+          <a:p>
+            <a:r>
+              <a:rPr lang="en-IN" sz="2000" b="1" dirty="0">
+                <a:latin typeface="Times New Roman" panose="02020603050405020304" pitchFamily="18" charset="0"/>
+                <a:cs typeface="Times New Roman" panose="02020603050405020304" pitchFamily="18" charset="0"/>
+              </a:rPr>
+              <a:t>4VP22CD058</a:t>
+            </a:r>
           </a:p>
         </p:txBody>
       </p:sp>

</xml_diff>